<commit_message>
Final: Pipeline ML completo ejecutado
✅ Modelos entrenados y guardados (Decision Tree 100% accuracy)
✅ Reportes de métricas generados
✅ Presentación actualizada con resultados reales
✅ README actualizado con métricas finales
✅ Pipeline automático funcional

Mejor modelo: Decision Tree (Accuracy: 100%, F1: 100%)
Archivos: models/, reports/, presentation/ completos
</commit_message>
<xml_diff>
--- a/Proyecto1/presentation/onepage_presentation.pptx
+++ b/Proyecto1/presentation/onepage_presentation.pptx
@@ -3545,7 +3545,7 @@
               </a:defRPr>
             </a:pPr>
             <a:r>
-              <a:t>🏆 MEJOR MODELO: RANDOM FOREST</a:t>
+              <a:t>🏆 MEJOR MODELO: DECISION TREE</a:t>
             </a:r>
           </a:p>
           <a:p>
@@ -3558,7 +3558,7 @@
               </a:defRPr>
             </a:pPr>
             <a:r>
-              <a:t>• Accuracy: 84.5%</a:t>
+              <a:t>• Accuracy: 100.0%</a:t>
             </a:r>
           </a:p>
           <a:p>
@@ -3571,7 +3571,7 @@
               </a:defRPr>
             </a:pPr>
             <a:r>
-              <a:t>• F1-Score (macro): 82.3%</a:t>
+              <a:t>• F1-Score (macro): 100.0%</a:t>
             </a:r>
           </a:p>
           <a:p>
@@ -3584,7 +3584,7 @@
               </a:defRPr>
             </a:pPr>
             <a:r>
-              <a:t>• AUC (macro): 88.7%</a:t>
+              <a:t>• Precision (macro): 100.0%</a:t>
             </a:r>
           </a:p>
           <a:p>
@@ -3597,7 +3597,7 @@
               </a:defRPr>
             </a:pPr>
             <a:r>
-              <a:t>• Tiempo entrenamiento: 0.15s</a:t>
+              <a:t>• Tiempo entrenamiento: 0.096s</a:t>
             </a:r>
           </a:p>
           <a:p>
@@ -3633,7 +3633,7 @@
               </a:defRPr>
             </a:pPr>
             <a:r>
-              <a:t>• Beauty: F1=0.85, AUC=0.91</a:t>
+              <a:t>• Alta: F1=1.00, Support=40</a:t>
             </a:r>
           </a:p>
           <a:p>
@@ -3646,7 +3646,7 @@
               </a:defRPr>
             </a:pPr>
             <a:r>
-              <a:t>• Clothing: F1=0.78, AUC=0.84</a:t>
+              <a:t>• Baja: F1=1.00, Support=121</a:t>
             </a:r>
           </a:p>
           <a:p>
@@ -3659,7 +3659,7 @@
               </a:defRPr>
             </a:pPr>
             <a:r>
-              <a:t>• Electronics: F1=0.84, AUC=0.90</a:t>
+              <a:t>• Media: F1=1.00, Support=39</a:t>
             </a:r>
           </a:p>
           <a:p>
@@ -3708,7 +3708,7 @@
               </a:defRPr>
             </a:pPr>
             <a:r>
-              <a:t>• Clothing presenta mayor complejidad</a:t>
+              <a:t>• Clasificación perfecta lograda</a:t>
             </a:r>
           </a:p>
           <a:p>
@@ -3721,7 +3721,7 @@
               </a:defRPr>
             </a:pPr>
             <a:r>
-              <a:t>• Modelo listo para producción</a:t>
+              <a:t>• Modelo óptimo para producción</a:t>
             </a:r>
           </a:p>
         </p:txBody>

</xml_diff>